<commit_message>
Update of presentation and samples
</commit_message>
<xml_diff>
--- a/Introducción a la integración continua.pptx
+++ b/Introducción a la integración continua.pptx
@@ -5,10 +5,10 @@
     <p:sldMasterId id="2147483648" r:id="rId4"/>
   </p:sldMasterIdLst>
   <p:notesMasterIdLst>
-    <p:notesMasterId r:id="rId12"/>
+    <p:notesMasterId r:id="rId14"/>
   </p:notesMasterIdLst>
   <p:handoutMasterIdLst>
-    <p:handoutMasterId r:id="rId13"/>
+    <p:handoutMasterId r:id="rId15"/>
   </p:handoutMasterIdLst>
   <p:sldIdLst>
     <p:sldId id="256" r:id="rId5"/>
@@ -18,6 +18,8 @@
     <p:sldId id="261" r:id="rId9"/>
     <p:sldId id="262" r:id="rId10"/>
     <p:sldId id="263" r:id="rId11"/>
+    <p:sldId id="264" r:id="rId12"/>
+    <p:sldId id="265" r:id="rId13"/>
   </p:sldIdLst>
   <p:sldSz cx="12192000" cy="6858000"/>
   <p:notesSz cx="6858000" cy="9144000"/>
@@ -26558,7 +26560,52 @@
             <a:endParaRPr lang="es-ES" sz="2800" dirty="0" smtClean="0"/>
           </a:p>
           <a:p>
-            <a:endParaRPr lang="es-HN" sz="2800" dirty="0"/>
+            <a:r>
+              <a:rPr lang="es-ES" sz="2800" dirty="0"/>
+              <a:t>Cuando necesitemos cualquier implementación de la interfaz mapeada podemos </a:t>
+            </a:r>
+            <a:r>
+              <a:rPr lang="es-ES" sz="2800" dirty="0" smtClean="0"/>
+              <a:t>obtenerla </a:t>
+            </a:r>
+            <a:r>
+              <a:rPr lang="es-ES" sz="2800" dirty="0"/>
+              <a:t>directamente del </a:t>
+            </a:r>
+            <a:r>
+              <a:rPr lang="es-ES" sz="2800" dirty="0" err="1"/>
+              <a:t>Kernel</a:t>
+            </a:r>
+            <a:r>
+              <a:rPr lang="es-ES" sz="2800" dirty="0" smtClean="0"/>
+              <a:t>.</a:t>
+            </a:r>
+          </a:p>
+          <a:p>
+            <a:r>
+              <a:rPr lang="es-HN" sz="2800" dirty="0" err="1"/>
+              <a:t>Ninject</a:t>
+            </a:r>
+            <a:r>
+              <a:rPr lang="es-HN" sz="2800" dirty="0"/>
+              <a:t> viene con un </a:t>
+            </a:r>
+            <a:r>
+              <a:rPr lang="es-HN" sz="2800" dirty="0" err="1"/>
+              <a:t>Kernel</a:t>
+            </a:r>
+            <a:r>
+              <a:rPr lang="es-HN" sz="2800" dirty="0"/>
+              <a:t> incorporado llamado </a:t>
+            </a:r>
+            <a:r>
+              <a:rPr lang="es-HN" sz="2800" dirty="0" err="1"/>
+              <a:t>StandardKernel</a:t>
+            </a:r>
+            <a:r>
+              <a:rPr lang="es-HN" sz="2800" dirty="0"/>
+              <a:t>.</a:t>
+            </a:r>
           </a:p>
         </p:txBody>
       </p:sp>
@@ -26572,6 +26619,841 @@
   <p:clrMapOvr>
     <a:masterClrMapping/>
   </p:clrMapOvr>
+</p:sld>
+</file>
+
+<file path=ppt/slides/slide8.xml><?xml version="1.0" encoding="utf-8"?>
+<p:sld xmlns:a="http://schemas.openxmlformats.org/drawingml/2006/main" xmlns:r="http://schemas.openxmlformats.org/officeDocument/2006/relationships" xmlns:p="http://schemas.openxmlformats.org/presentationml/2006/main">
+  <p:cSld>
+    <p:spTree>
+      <p:nvGrpSpPr>
+        <p:cNvPr id="1" name=""/>
+        <p:cNvGrpSpPr/>
+        <p:nvPr/>
+      </p:nvGrpSpPr>
+      <p:grpSpPr>
+        <a:xfrm>
+          <a:off x="0" y="0"/>
+          <a:ext cx="0" cy="0"/>
+          <a:chOff x="0" y="0"/>
+          <a:chExt cx="0" cy="0"/>
+        </a:xfrm>
+      </p:grpSpPr>
+      <p:sp>
+        <p:nvSpPr>
+          <p:cNvPr id="2" name="Title 1"/>
+          <p:cNvSpPr>
+            <a:spLocks noGrp="1"/>
+          </p:cNvSpPr>
+          <p:nvPr>
+            <p:ph type="title"/>
+          </p:nvPr>
+        </p:nvSpPr>
+        <p:spPr/>
+        <p:txBody>
+          <a:bodyPr/>
+          <a:lstStyle/>
+          <a:p>
+            <a:r>
+              <a:rPr lang="es-HN" dirty="0" err="1" smtClean="0"/>
+              <a:t>Ninject</a:t>
+            </a:r>
+            <a:r>
+              <a:rPr lang="es-HN" dirty="0" smtClean="0"/>
+              <a:t> </a:t>
+            </a:r>
+            <a:r>
+              <a:rPr lang="es-HN" dirty="0" err="1" smtClean="0"/>
+              <a:t>Scoping</a:t>
+            </a:r>
+            <a:endParaRPr lang="es-HN" dirty="0"/>
+          </a:p>
+        </p:txBody>
+      </p:sp>
+      <p:sp>
+        <p:nvSpPr>
+          <p:cNvPr id="3" name="Slide Number Placeholder 2"/>
+          <p:cNvSpPr>
+            <a:spLocks noGrp="1"/>
+          </p:cNvSpPr>
+          <p:nvPr>
+            <p:ph type="sldNum" sz="quarter" idx="12"/>
+          </p:nvPr>
+        </p:nvSpPr>
+        <p:spPr/>
+        <p:txBody>
+          <a:bodyPr/>
+          <a:lstStyle/>
+          <a:p>
+            <a:fld id="{C263D6C4-4840-40CC-AC84-17E24B3B7BDE}" type="slidenum">
+              <a:rPr lang="en-US" noProof="0" smtClean="0"/>
+              <a:pPr/>
+              <a:t>8</a:t>
+            </a:fld>
+            <a:endParaRPr lang="en-US" noProof="0" dirty="0"/>
+          </a:p>
+        </p:txBody>
+      </p:sp>
+      <p:sp>
+        <p:nvSpPr>
+          <p:cNvPr id="4" name="Text Placeholder 3"/>
+          <p:cNvSpPr>
+            <a:spLocks noGrp="1"/>
+          </p:cNvSpPr>
+          <p:nvPr>
+            <p:ph type="body" sz="quarter" idx="13"/>
+          </p:nvPr>
+        </p:nvSpPr>
+        <p:spPr>
+          <a:xfrm>
+            <a:off x="493756" y="1127920"/>
+            <a:ext cx="11450938" cy="5643583"/>
+          </a:xfrm>
+        </p:spPr>
+        <p:txBody>
+          <a:bodyPr/>
+          <a:lstStyle/>
+          <a:p>
+            <a:r>
+              <a:rPr lang="es-ES" sz="2800" dirty="0"/>
+              <a:t>Una característica interesante de los contenedores de </a:t>
+            </a:r>
+            <a:r>
+              <a:rPr lang="es-ES" sz="2800" dirty="0" err="1"/>
+              <a:t>IdC</a:t>
+            </a:r>
+            <a:r>
+              <a:rPr lang="es-ES" sz="2800" dirty="0"/>
+              <a:t> es la capacidad de limitar la vida de los </a:t>
+            </a:r>
+            <a:r>
+              <a:rPr lang="es-ES" sz="2800" dirty="0" smtClean="0"/>
+              <a:t>objetos (</a:t>
+            </a:r>
+            <a:r>
+              <a:rPr lang="es-ES" sz="2800" dirty="0" err="1" smtClean="0"/>
+              <a:t>scope</a:t>
+            </a:r>
+            <a:r>
+              <a:rPr lang="es-ES" sz="2800" dirty="0" smtClean="0"/>
+              <a:t>). </a:t>
+            </a:r>
+            <a:r>
+              <a:rPr lang="es-HN" sz="2800" dirty="0" err="1" smtClean="0"/>
+              <a:t>Ninject</a:t>
+            </a:r>
+            <a:r>
+              <a:rPr lang="es-HN" sz="2800" dirty="0" smtClean="0"/>
+              <a:t> </a:t>
+            </a:r>
+            <a:r>
+              <a:rPr lang="es-HN" sz="2800" dirty="0"/>
+              <a:t>ofrece lo </a:t>
+            </a:r>
+            <a:r>
+              <a:rPr lang="es-HN" sz="2800" dirty="0" smtClean="0"/>
+              <a:t>siguiente:</a:t>
+            </a:r>
+          </a:p>
+          <a:p>
+            <a:pPr lvl="1"/>
+            <a:endParaRPr lang="es-HN" sz="2600" dirty="0" smtClean="0"/>
+          </a:p>
+          <a:p>
+            <a:pPr lvl="1"/>
+            <a:endParaRPr lang="es-HN" sz="2600" dirty="0"/>
+          </a:p>
+          <a:p>
+            <a:pPr lvl="1"/>
+            <a:endParaRPr lang="es-HN" sz="2600" dirty="0" smtClean="0"/>
+          </a:p>
+          <a:p>
+            <a:pPr lvl="1"/>
+            <a:endParaRPr lang="es-HN" sz="2600" dirty="0"/>
+          </a:p>
+          <a:p>
+            <a:pPr lvl="1"/>
+            <a:endParaRPr lang="es-HN" sz="2600" dirty="0" smtClean="0"/>
+          </a:p>
+          <a:p>
+            <a:pPr lvl="1"/>
+            <a:endParaRPr lang="es-HN" sz="2600" dirty="0"/>
+          </a:p>
+          <a:p>
+            <a:pPr lvl="1"/>
+            <a:r>
+              <a:rPr lang="es-ES" sz="2600" dirty="0"/>
+              <a:t>Para una lista completa y ejemplos visite</a:t>
+            </a:r>
+            <a:r>
+              <a:rPr lang="es-ES" sz="2600" dirty="0" smtClean="0"/>
+              <a:t>: </a:t>
+            </a:r>
+            <a:r>
+              <a:rPr lang="en-US" sz="2800" dirty="0">
+                <a:hlinkClick r:id="rId2"/>
+              </a:rPr>
+              <a:t>https://github.com/ninject/Ninject/wiki/Object-Scopes</a:t>
+            </a:r>
+            <a:endParaRPr lang="es-HN" sz="2600" dirty="0"/>
+          </a:p>
+        </p:txBody>
+      </p:sp>
+      <p:graphicFrame>
+        <p:nvGraphicFramePr>
+          <p:cNvPr id="5" name="Table 4"/>
+          <p:cNvGraphicFramePr>
+            <a:graphicFrameLocks noGrp="1"/>
+          </p:cNvGraphicFramePr>
+          <p:nvPr>
+            <p:extLst>
+              <p:ext uri="{D42A27DB-BD31-4B8C-83A1-F6EECF244321}">
+                <p14:modId xmlns:p14="http://schemas.microsoft.com/office/powerpoint/2010/main" val="3772341684"/>
+              </p:ext>
+            </p:extLst>
+          </p:nvPr>
+        </p:nvGraphicFramePr>
+        <p:xfrm>
+          <a:off x="779849" y="2548466"/>
+          <a:ext cx="10878752" cy="2931160"/>
+        </p:xfrm>
+        <a:graphic>
+          <a:graphicData uri="http://schemas.openxmlformats.org/drawingml/2006/table">
+            <a:tbl>
+              <a:tblPr firstRow="1" bandRow="1">
+                <a:tableStyleId>{5C22544A-7EE6-4342-B048-85BDC9FD1C3A}</a:tableStyleId>
+              </a:tblPr>
+              <a:tblGrid>
+                <a:gridCol w="2719688"/>
+                <a:gridCol w="2719688"/>
+                <a:gridCol w="2719688"/>
+                <a:gridCol w="2719688"/>
+              </a:tblGrid>
+              <a:tr h="370840">
+                <a:tc>
+                  <a:txBody>
+                    <a:bodyPr/>
+                    <a:lstStyle/>
+                    <a:p>
+                      <a:r>
+                        <a:rPr lang="es-HN" sz="1200" dirty="0" err="1" smtClean="0"/>
+                        <a:t>Scope</a:t>
+                      </a:r>
+                      <a:endParaRPr lang="es-HN" sz="1200" dirty="0"/>
+                    </a:p>
+                  </a:txBody>
+                  <a:tcPr/>
+                </a:tc>
+                <a:tc>
+                  <a:txBody>
+                    <a:bodyPr/>
+                    <a:lstStyle/>
+                    <a:p>
+                      <a:r>
+                        <a:rPr lang="es-HN" sz="1200" dirty="0" smtClean="0"/>
+                        <a:t>Provocado por</a:t>
+                      </a:r>
+                      <a:endParaRPr lang="es-HN" sz="1200" dirty="0"/>
+                    </a:p>
+                  </a:txBody>
+                  <a:tcPr/>
+                </a:tc>
+                <a:tc>
+                  <a:txBody>
+                    <a:bodyPr/>
+                    <a:lstStyle/>
+                    <a:p>
+                      <a:r>
+                        <a:rPr lang="es-HN" sz="1200" dirty="0" smtClean="0"/>
+                        <a:t>Significado</a:t>
+                      </a:r>
+                      <a:endParaRPr lang="es-HN" sz="1200" dirty="0"/>
+                    </a:p>
+                  </a:txBody>
+                  <a:tcPr/>
+                </a:tc>
+                <a:tc>
+                  <a:txBody>
+                    <a:bodyPr/>
+                    <a:lstStyle/>
+                    <a:p>
+                      <a:r>
+                        <a:rPr lang="es-HN" sz="1200" dirty="0" smtClean="0"/>
+                        <a:t>Disposición</a:t>
+                      </a:r>
+                      <a:endParaRPr lang="es-HN" sz="1200" dirty="0"/>
+                    </a:p>
+                  </a:txBody>
+                  <a:tcPr/>
+                </a:tc>
+              </a:tr>
+              <a:tr h="370840">
+                <a:tc>
+                  <a:txBody>
+                    <a:bodyPr/>
+                    <a:lstStyle/>
+                    <a:p>
+                      <a:r>
+                        <a:rPr lang="es-HN" sz="1200" dirty="0" smtClean="0"/>
+                        <a:t>Transitorio</a:t>
+                      </a:r>
+                      <a:endParaRPr lang="es-HN" sz="1200" dirty="0"/>
+                    </a:p>
+                  </a:txBody>
+                  <a:tcPr/>
+                </a:tc>
+                <a:tc>
+                  <a:txBody>
+                    <a:bodyPr/>
+                    <a:lstStyle/>
+                    <a:p>
+                      <a:r>
+                        <a:rPr lang="es-HN" sz="1200" dirty="0" smtClean="0"/>
+                        <a:t>.</a:t>
+                      </a:r>
+                      <a:r>
+                        <a:rPr lang="es-HN" sz="1200" dirty="0" err="1" smtClean="0"/>
+                        <a:t>InTransientScope</a:t>
+                      </a:r>
+                      <a:r>
+                        <a:rPr lang="es-HN" sz="1200" dirty="0" smtClean="0"/>
+                        <a:t>()</a:t>
+                      </a:r>
+                    </a:p>
+                    <a:p>
+                      <a:endParaRPr lang="es-HN" sz="1200" dirty="0" smtClean="0"/>
+                    </a:p>
+                    <a:p>
+                      <a:r>
+                        <a:rPr lang="es-HN" sz="1200" dirty="0" err="1" smtClean="0"/>
+                        <a:t>this.Bind</a:t>
+                      </a:r>
+                      <a:r>
+                        <a:rPr lang="es-HN" sz="1200" dirty="0" smtClean="0"/>
+                        <a:t>&lt;</a:t>
+                      </a:r>
+                      <a:r>
+                        <a:rPr lang="es-HN" sz="1200" dirty="0" err="1" smtClean="0"/>
+                        <a:t>ConnectionRepository</a:t>
+                      </a:r>
+                      <a:r>
+                        <a:rPr lang="es-HN" sz="1200" dirty="0" smtClean="0"/>
+                        <a:t>&gt;().</a:t>
+                      </a:r>
+                      <a:r>
+                        <a:rPr lang="es-HN" sz="1200" dirty="0" err="1" smtClean="0"/>
+                        <a:t>ToSelf</a:t>
+                      </a:r>
+                      <a:r>
+                        <a:rPr lang="es-HN" sz="1200" dirty="0" smtClean="0"/>
+                        <a:t>()</a:t>
+                      </a:r>
+                      <a:endParaRPr lang="es-HN" sz="1200" dirty="0"/>
+                    </a:p>
+                  </a:txBody>
+                  <a:tcPr/>
+                </a:tc>
+                <a:tc>
+                  <a:txBody>
+                    <a:bodyPr/>
+                    <a:lstStyle/>
+                    <a:p>
+                      <a:r>
+                        <a:rPr lang="es-ES" sz="1200" dirty="0" smtClean="0"/>
+                        <a:t>Se creará una nueva instancia del tipo cada vez que se solicite. Este es el </a:t>
+                      </a:r>
+                      <a:r>
+                        <a:rPr lang="es-ES" sz="1200" dirty="0" err="1" smtClean="0"/>
+                        <a:t>scope</a:t>
+                      </a:r>
+                      <a:r>
+                        <a:rPr lang="es-ES" sz="1200" dirty="0" smtClean="0"/>
+                        <a:t> por defecto si no se especifica ninguno.</a:t>
+                      </a:r>
+                      <a:endParaRPr lang="es-HN" sz="1200" dirty="0"/>
+                    </a:p>
+                  </a:txBody>
+                  <a:tcPr/>
+                </a:tc>
+                <a:tc>
+                  <a:txBody>
+                    <a:bodyPr/>
+                    <a:lstStyle/>
+                    <a:p>
+                      <a:r>
+                        <a:rPr lang="es-ES" sz="1200" dirty="0" smtClean="0"/>
+                        <a:t>La vida no es manejada por el </a:t>
+                      </a:r>
+                      <a:r>
+                        <a:rPr lang="es-ES" sz="1200" dirty="0" err="1" smtClean="0"/>
+                        <a:t>Kernel</a:t>
+                      </a:r>
+                      <a:r>
+                        <a:rPr lang="es-ES" sz="1200" dirty="0" smtClean="0"/>
+                        <a:t> (el objeto </a:t>
+                      </a:r>
+                      <a:r>
+                        <a:rPr lang="es-ES" sz="1200" dirty="0" err="1" smtClean="0"/>
+                        <a:t>Scope</a:t>
+                      </a:r>
+                      <a:r>
+                        <a:rPr lang="es-ES" sz="1200" dirty="0" smtClean="0"/>
+                        <a:t> es nulo) y nunca será desechado</a:t>
+                      </a:r>
+                      <a:endParaRPr lang="es-HN" sz="1200" dirty="0"/>
+                    </a:p>
+                  </a:txBody>
+                  <a:tcPr/>
+                </a:tc>
+              </a:tr>
+              <a:tr h="370840">
+                <a:tc>
+                  <a:txBody>
+                    <a:bodyPr/>
+                    <a:lstStyle/>
+                    <a:p>
+                      <a:r>
+                        <a:rPr lang="en-US" sz="1200" b="0" i="0" kern="1200" dirty="0" err="1" smtClean="0">
+                          <a:solidFill>
+                            <a:schemeClr val="dk1"/>
+                          </a:solidFill>
+                          <a:effectLst/>
+                          <a:latin typeface="+mn-lt"/>
+                          <a:ea typeface="+mn-ea"/>
+                          <a:cs typeface="+mn-cs"/>
+                        </a:rPr>
+                        <a:t>Unico</a:t>
+                      </a:r>
+                      <a:r>
+                        <a:rPr lang="en-US" sz="1200" b="0" i="0" kern="1200" dirty="0" smtClean="0">
+                          <a:solidFill>
+                            <a:schemeClr val="dk1"/>
+                          </a:solidFill>
+                          <a:effectLst/>
+                          <a:latin typeface="+mn-lt"/>
+                          <a:ea typeface="+mn-ea"/>
+                          <a:cs typeface="+mn-cs"/>
+                        </a:rPr>
+                        <a:t> </a:t>
+                      </a:r>
+                      <a:endParaRPr lang="es-HN" sz="1200" dirty="0"/>
+                    </a:p>
+                  </a:txBody>
+                  <a:tcPr/>
+                </a:tc>
+                <a:tc>
+                  <a:txBody>
+                    <a:bodyPr/>
+                    <a:lstStyle/>
+                    <a:p>
+                      <a:r>
+                        <a:rPr lang="en-US" sz="1200" dirty="0" smtClean="0"/>
+                        <a:t>.</a:t>
+                      </a:r>
+                      <a:r>
+                        <a:rPr lang="en-US" sz="1200" dirty="0" err="1" smtClean="0"/>
+                        <a:t>InSingletonScope</a:t>
+                      </a:r>
+                      <a:r>
+                        <a:rPr lang="en-US" sz="1200" dirty="0" smtClean="0"/>
+                        <a:t>()</a:t>
+                      </a:r>
+                    </a:p>
+                    <a:p>
+                      <a:endParaRPr lang="en-US" sz="1200" b="0" i="0" kern="1200" dirty="0" smtClean="0">
+                        <a:solidFill>
+                          <a:schemeClr val="dk1"/>
+                        </a:solidFill>
+                        <a:effectLst/>
+                        <a:latin typeface="+mn-lt"/>
+                        <a:ea typeface="+mn-ea"/>
+                        <a:cs typeface="+mn-cs"/>
+                      </a:endParaRPr>
+                    </a:p>
+                    <a:p>
+                      <a:r>
+                        <a:rPr lang="en-US" sz="1200" dirty="0" smtClean="0"/>
+                        <a:t>.</a:t>
+                      </a:r>
+                      <a:r>
+                        <a:rPr lang="en-US" sz="1200" dirty="0" err="1" smtClean="0"/>
+                        <a:t>ToConstant</a:t>
+                      </a:r>
+                      <a:r>
+                        <a:rPr lang="en-US" sz="1200" dirty="0" smtClean="0"/>
+                        <a:t>()</a:t>
+                      </a:r>
+                      <a:endParaRPr lang="es-HN" sz="1200" dirty="0"/>
+                    </a:p>
+                  </a:txBody>
+                  <a:tcPr/>
+                </a:tc>
+                <a:tc>
+                  <a:txBody>
+                    <a:bodyPr/>
+                    <a:lstStyle/>
+                    <a:p>
+                      <a:r>
+                        <a:rPr lang="es-ES" sz="1200" dirty="0" smtClean="0"/>
+                        <a:t>Sólo se creará una única instancia del tipo, y se devolverá la misma instancia para cada solicitud posterior.</a:t>
+                      </a:r>
+                      <a:endParaRPr lang="es-HN" sz="1200" dirty="0"/>
+                    </a:p>
+                  </a:txBody>
+                  <a:tcPr/>
+                </a:tc>
+                <a:tc>
+                  <a:txBody>
+                    <a:bodyPr/>
+                    <a:lstStyle/>
+                    <a:p>
+                      <a:r>
+                        <a:rPr lang="es-HN" sz="1200" dirty="0" smtClean="0"/>
+                        <a:t>Dispuesto cuando se dispone del </a:t>
+                      </a:r>
+                      <a:r>
+                        <a:rPr lang="es-HN" sz="1200" dirty="0" err="1" smtClean="0"/>
+                        <a:t>Kernel</a:t>
+                      </a:r>
+                      <a:r>
+                        <a:rPr lang="es-HN" sz="1200" dirty="0" smtClean="0"/>
+                        <a:t>.</a:t>
+                      </a:r>
+                      <a:endParaRPr lang="es-HN" sz="1200" dirty="0"/>
+                    </a:p>
+                  </a:txBody>
+                  <a:tcPr/>
+                </a:tc>
+              </a:tr>
+              <a:tr h="370840">
+                <a:tc>
+                  <a:txBody>
+                    <a:bodyPr/>
+                    <a:lstStyle/>
+                    <a:p>
+                      <a:r>
+                        <a:rPr lang="en-US" sz="1200" b="0" i="0" kern="1200" dirty="0" smtClean="0">
+                          <a:solidFill>
+                            <a:schemeClr val="dk1"/>
+                          </a:solidFill>
+                          <a:effectLst/>
+                          <a:latin typeface="+mn-lt"/>
+                          <a:ea typeface="+mn-ea"/>
+                          <a:cs typeface="+mn-cs"/>
+                        </a:rPr>
+                        <a:t>Thread</a:t>
+                      </a:r>
+                      <a:endParaRPr lang="es-HN" sz="1200" dirty="0"/>
+                    </a:p>
+                  </a:txBody>
+                  <a:tcPr/>
+                </a:tc>
+                <a:tc>
+                  <a:txBody>
+                    <a:bodyPr/>
+                    <a:lstStyle/>
+                    <a:p>
+                      <a:r>
+                        <a:rPr lang="en-US" sz="1200" b="0" i="0" kern="1200" dirty="0" smtClean="0">
+                          <a:solidFill>
+                            <a:schemeClr val="dk1"/>
+                          </a:solidFill>
+                          <a:effectLst/>
+                          <a:latin typeface="+mn-lt"/>
+                          <a:ea typeface="+mn-ea"/>
+                          <a:cs typeface="+mn-cs"/>
+                        </a:rPr>
+                        <a:t>.</a:t>
+                      </a:r>
+                      <a:r>
+                        <a:rPr lang="en-US" sz="1200" b="0" i="0" kern="1200" dirty="0" err="1" smtClean="0">
+                          <a:solidFill>
+                            <a:schemeClr val="dk1"/>
+                          </a:solidFill>
+                          <a:effectLst/>
+                          <a:latin typeface="+mn-lt"/>
+                          <a:ea typeface="+mn-ea"/>
+                          <a:cs typeface="+mn-cs"/>
+                        </a:rPr>
+                        <a:t>InThreadScope</a:t>
+                      </a:r>
+                      <a:r>
+                        <a:rPr lang="en-US" sz="1200" b="0" i="0" kern="1200" dirty="0" smtClean="0">
+                          <a:solidFill>
+                            <a:schemeClr val="dk1"/>
+                          </a:solidFill>
+                          <a:effectLst/>
+                          <a:latin typeface="+mn-lt"/>
+                          <a:ea typeface="+mn-ea"/>
+                          <a:cs typeface="+mn-cs"/>
+                        </a:rPr>
+                        <a:t>()</a:t>
+                      </a:r>
+                      <a:endParaRPr lang="es-HN" sz="1200" dirty="0"/>
+                    </a:p>
+                  </a:txBody>
+                  <a:tcPr/>
+                </a:tc>
+                <a:tc>
+                  <a:txBody>
+                    <a:bodyPr/>
+                    <a:lstStyle/>
+                    <a:p>
+                      <a:r>
+                        <a:rPr lang="es-ES" sz="1200" dirty="0" smtClean="0"/>
+                        <a:t>Se creará una instancia del tipo por cada </a:t>
+                      </a:r>
+                      <a:r>
+                        <a:rPr lang="es-ES" sz="1200" dirty="0" err="1" smtClean="0"/>
+                        <a:t>thread</a:t>
+                      </a:r>
+                      <a:r>
+                        <a:rPr lang="es-ES" sz="1200" dirty="0" smtClean="0"/>
+                        <a:t>.</a:t>
+                      </a:r>
+                      <a:endParaRPr lang="es-HN" sz="1200" dirty="0"/>
+                    </a:p>
+                  </a:txBody>
+                  <a:tcPr/>
+                </a:tc>
+                <a:tc>
+                  <a:txBody>
+                    <a:bodyPr/>
+                    <a:lstStyle/>
+                    <a:p>
+                      <a:r>
+                        <a:rPr lang="es-ES" sz="1200" dirty="0" smtClean="0"/>
+                        <a:t>Se dispone cuando el objeto </a:t>
+                      </a:r>
+                      <a:r>
+                        <a:rPr lang="es-ES" sz="1200" dirty="0" err="1" smtClean="0"/>
+                        <a:t>Thread</a:t>
+                      </a:r>
+                      <a:r>
+                        <a:rPr lang="es-ES" sz="1200" dirty="0" smtClean="0"/>
+                        <a:t> subyacente es dispuesto.</a:t>
+                      </a:r>
+                      <a:endParaRPr lang="es-HN" sz="1200" dirty="0"/>
+                    </a:p>
+                  </a:txBody>
+                  <a:tcPr/>
+                </a:tc>
+              </a:tr>
+              <a:tr h="370840">
+                <a:tc>
+                  <a:txBody>
+                    <a:bodyPr/>
+                    <a:lstStyle/>
+                    <a:p>
+                      <a:r>
+                        <a:rPr lang="es-HN" sz="1200" dirty="0" smtClean="0"/>
+                        <a:t>Solicitar</a:t>
+                      </a:r>
+                      <a:endParaRPr lang="es-HN" sz="1200" dirty="0"/>
+                    </a:p>
+                  </a:txBody>
+                  <a:tcPr/>
+                </a:tc>
+                <a:tc>
+                  <a:txBody>
+                    <a:bodyPr/>
+                    <a:lstStyle/>
+                    <a:p>
+                      <a:r>
+                        <a:rPr lang="en-US" sz="1200" b="0" i="0" kern="1200" dirty="0" smtClean="0">
+                          <a:solidFill>
+                            <a:schemeClr val="dk1"/>
+                          </a:solidFill>
+                          <a:effectLst/>
+                          <a:latin typeface="+mn-lt"/>
+                          <a:ea typeface="+mn-ea"/>
+                          <a:cs typeface="+mn-cs"/>
+                        </a:rPr>
+                        <a:t>.</a:t>
+                      </a:r>
+                      <a:r>
+                        <a:rPr lang="en-US" sz="1200" b="0" i="0" kern="1200" dirty="0" err="1" smtClean="0">
+                          <a:solidFill>
+                            <a:schemeClr val="dk1"/>
+                          </a:solidFill>
+                          <a:effectLst/>
+                          <a:latin typeface="+mn-lt"/>
+                          <a:ea typeface="+mn-ea"/>
+                          <a:cs typeface="+mn-cs"/>
+                        </a:rPr>
+                        <a:t>InRequestScope</a:t>
+                      </a:r>
+                      <a:r>
+                        <a:rPr lang="en-US" sz="1200" b="0" i="0" kern="1200" dirty="0" smtClean="0">
+                          <a:solidFill>
+                            <a:schemeClr val="dk1"/>
+                          </a:solidFill>
+                          <a:effectLst/>
+                          <a:latin typeface="+mn-lt"/>
+                          <a:ea typeface="+mn-ea"/>
+                          <a:cs typeface="+mn-cs"/>
+                        </a:rPr>
+                        <a:t>()</a:t>
+                      </a:r>
+                      <a:endParaRPr lang="es-HN" sz="1200" dirty="0"/>
+                    </a:p>
+                  </a:txBody>
+                  <a:tcPr/>
+                </a:tc>
+                <a:tc>
+                  <a:txBody>
+                    <a:bodyPr/>
+                    <a:lstStyle/>
+                    <a:p>
+                      <a:r>
+                        <a:rPr lang="es-ES" sz="1200" dirty="0" smtClean="0"/>
+                        <a:t>Se creará una instancia del tipo para cada solicitud Web.</a:t>
+                      </a:r>
+                      <a:endParaRPr lang="es-HN" sz="1200" dirty="0"/>
+                    </a:p>
+                  </a:txBody>
+                  <a:tcPr/>
+                </a:tc>
+                <a:tc>
+                  <a:txBody>
+                    <a:bodyPr/>
+                    <a:lstStyle/>
+                    <a:p>
+                      <a:r>
+                        <a:rPr lang="es-ES" sz="1200" dirty="0" smtClean="0"/>
+                        <a:t>Las instancias se eliminan al final de la tramitación de la solicitud.</a:t>
+                      </a:r>
+                      <a:endParaRPr lang="es-HN" sz="1200" dirty="0"/>
+                    </a:p>
+                  </a:txBody>
+                  <a:tcPr/>
+                </a:tc>
+              </a:tr>
+            </a:tbl>
+          </a:graphicData>
+        </a:graphic>
+      </p:graphicFrame>
+    </p:spTree>
+    <p:extLst>
+      <p:ext uri="{BB962C8B-B14F-4D97-AF65-F5344CB8AC3E}">
+        <p14:creationId xmlns:p14="http://schemas.microsoft.com/office/powerpoint/2010/main" val="1474878444"/>
+      </p:ext>
+    </p:extLst>
+  </p:cSld>
+  <p:clrMapOvr>
+    <a:masterClrMapping/>
+  </p:clrMapOvr>
+  <p:timing>
+    <p:tnLst>
+      <p:par>
+        <p:cTn id="1" dur="indefinite" restart="never" nodeType="tmRoot"/>
+      </p:par>
+    </p:tnLst>
+  </p:timing>
+</p:sld>
+</file>
+
+<file path=ppt/slides/slide9.xml><?xml version="1.0" encoding="utf-8"?>
+<p:sld xmlns:a="http://schemas.openxmlformats.org/drawingml/2006/main" xmlns:r="http://schemas.openxmlformats.org/officeDocument/2006/relationships" xmlns:p="http://schemas.openxmlformats.org/presentationml/2006/main">
+  <p:cSld>
+    <p:spTree>
+      <p:nvGrpSpPr>
+        <p:cNvPr id="1" name=""/>
+        <p:cNvGrpSpPr/>
+        <p:nvPr/>
+      </p:nvGrpSpPr>
+      <p:grpSpPr>
+        <a:xfrm>
+          <a:off x="0" y="0"/>
+          <a:ext cx="0" cy="0"/>
+          <a:chOff x="0" y="0"/>
+          <a:chExt cx="0" cy="0"/>
+        </a:xfrm>
+      </p:grpSpPr>
+      <p:sp>
+        <p:nvSpPr>
+          <p:cNvPr id="2" name="Title 1"/>
+          <p:cNvSpPr>
+            <a:spLocks noGrp="1"/>
+          </p:cNvSpPr>
+          <p:nvPr>
+            <p:ph type="title"/>
+          </p:nvPr>
+        </p:nvSpPr>
+        <p:spPr/>
+        <p:txBody>
+          <a:bodyPr/>
+          <a:lstStyle/>
+          <a:p>
+            <a:endParaRPr lang="es-HN" dirty="0"/>
+          </a:p>
+        </p:txBody>
+      </p:sp>
+      <p:sp>
+        <p:nvSpPr>
+          <p:cNvPr id="3" name="Slide Number Placeholder 2"/>
+          <p:cNvSpPr>
+            <a:spLocks noGrp="1"/>
+          </p:cNvSpPr>
+          <p:nvPr>
+            <p:ph type="sldNum" sz="quarter" idx="12"/>
+          </p:nvPr>
+        </p:nvSpPr>
+        <p:spPr/>
+        <p:txBody>
+          <a:bodyPr/>
+          <a:lstStyle/>
+          <a:p>
+            <a:fld id="{C263D6C4-4840-40CC-AC84-17E24B3B7BDE}" type="slidenum">
+              <a:rPr lang="en-US" noProof="0" smtClean="0"/>
+              <a:pPr/>
+              <a:t>9</a:t>
+            </a:fld>
+            <a:endParaRPr lang="en-US" noProof="0" dirty="0"/>
+          </a:p>
+        </p:txBody>
+      </p:sp>
+      <p:sp>
+        <p:nvSpPr>
+          <p:cNvPr id="4" name="Text Placeholder 3"/>
+          <p:cNvSpPr>
+            <a:spLocks noGrp="1"/>
+          </p:cNvSpPr>
+          <p:nvPr>
+            <p:ph type="body" sz="quarter" idx="13"/>
+          </p:nvPr>
+        </p:nvSpPr>
+        <p:spPr>
+          <a:xfrm>
+            <a:off x="493756" y="1127920"/>
+            <a:ext cx="11450938" cy="5643583"/>
+          </a:xfrm>
+        </p:spPr>
+        <p:txBody>
+          <a:bodyPr/>
+          <a:lstStyle/>
+          <a:p>
+            <a:endParaRPr lang="es-HN" sz="2600" dirty="0"/>
+          </a:p>
+        </p:txBody>
+      </p:sp>
+    </p:spTree>
+    <p:extLst>
+      <p:ext uri="{BB962C8B-B14F-4D97-AF65-F5344CB8AC3E}">
+        <p14:creationId xmlns:p14="http://schemas.microsoft.com/office/powerpoint/2010/main" val="3144255191"/>
+      </p:ext>
+    </p:extLst>
+  </p:cSld>
+  <p:clrMapOvr>
+    <a:masterClrMapping/>
+  </p:clrMapOvr>
+  <p:timing>
+    <p:tnLst>
+      <p:par>
+        <p:cTn id="1" dur="indefinite" restart="never" nodeType="tmRoot"/>
+      </p:par>
+    </p:tnLst>
+  </p:timing>
 </p:sld>
 </file>
 

</xml_diff>